<commit_message>
Add content to documentation and presentation
</commit_message>
<xml_diff>
--- a/Documentation/PRIR_prezentacja_Antas_Kisielewski.pptx
+++ b/Documentation/PRIR_prezentacja_Antas_Kisielewski.pptx
@@ -7,7 +7,13 @@
   <p:sldIdLst>
     <p:sldId id="256" r:id="rId2"/>
     <p:sldId id="257" r:id="rId3"/>
-    <p:sldId id="265" r:id="rId4"/>
+    <p:sldId id="268" r:id="rId4"/>
+    <p:sldId id="270" r:id="rId5"/>
+    <p:sldId id="269" r:id="rId6"/>
+    <p:sldId id="271" r:id="rId7"/>
+    <p:sldId id="267" r:id="rId8"/>
+    <p:sldId id="266" r:id="rId9"/>
+    <p:sldId id="265" r:id="rId10"/>
   </p:sldIdLst>
   <p:sldSz cx="9144000" cy="6858000" type="screen4x3"/>
   <p:notesSz cx="6858000" cy="9144000"/>
@@ -107,6 +113,306 @@
     </a:lvl9pPr>
   </p:defaultTextStyle>
 </p:presentation>
+</file>
+
+<file path=ppt/charts/chart1.xml><?xml version="1.0" encoding="utf-8"?>
+<c:chartSpace xmlns:c="http://schemas.openxmlformats.org/drawingml/2006/chart" xmlns:a="http://schemas.openxmlformats.org/drawingml/2006/main" xmlns:r="http://schemas.openxmlformats.org/officeDocument/2006/relationships">
+  <c:date1904 val="1"/>
+  <c:lang val="pl-PL"/>
+  <c:chart>
+    <c:autoTitleDeleted val="1"/>
+    <c:plotArea>
+      <c:layout>
+        <c:manualLayout>
+          <c:layoutTarget val="inner"/>
+          <c:xMode val="edge"/>
+          <c:yMode val="edge"/>
+          <c:x val="0.13421796827791821"/>
+          <c:y val="8.7503245428582038E-2"/>
+          <c:w val="0.80732821718955705"/>
+          <c:h val="0.73598001110494171"/>
+        </c:manualLayout>
+      </c:layout>
+      <c:scatterChart>
+        <c:scatterStyle val="smoothMarker"/>
+        <c:ser>
+          <c:idx val="0"/>
+          <c:order val="0"/>
+          <c:spPr>
+            <a:ln w="25400">
+              <a:solidFill>
+                <a:srgbClr val="4F81BD">
+                  <a:shade val="95000"/>
+                  <a:satMod val="105000"/>
+                  <a:alpha val="51000"/>
+                </a:srgbClr>
+              </a:solidFill>
+              <a:prstDash val="sysDash"/>
+            </a:ln>
+          </c:spPr>
+          <c:marker>
+            <c:symbol val="circle"/>
+            <c:size val="5"/>
+          </c:marker>
+          <c:dLbls>
+            <c:dLbl>
+              <c:idx val="0"/>
+              <c:layout>
+                <c:manualLayout>
+                  <c:x val="-7.0546749459572677E-2"/>
+                  <c:y val="-3.5328808278624689E-2"/>
+                </c:manualLayout>
+              </c:layout>
+              <c:showVal val="1"/>
+            </c:dLbl>
+            <c:dLbl>
+              <c:idx val="1"/>
+              <c:layout>
+                <c:manualLayout>
+                  <c:x val="-6.6137577618349402E-2"/>
+                  <c:y val="-3.5328808278624689E-2"/>
+                </c:manualLayout>
+              </c:layout>
+              <c:showVal val="1"/>
+            </c:dLbl>
+            <c:dLbl>
+              <c:idx val="2"/>
+              <c:layout>
+                <c:manualLayout>
+                  <c:x val="-7.0546749459572677E-2"/>
+                  <c:y val="-3.1403385136555259E-2"/>
+                </c:manualLayout>
+              </c:layout>
+              <c:showVal val="1"/>
+            </c:dLbl>
+            <c:dLbl>
+              <c:idx val="3"/>
+              <c:layout>
+                <c:manualLayout>
+                  <c:x val="-6.3932991697737848E-2"/>
+                  <c:y val="-4.3179654562763445E-2"/>
+                </c:manualLayout>
+              </c:layout>
+              <c:showVal val="1"/>
+            </c:dLbl>
+            <c:dLbl>
+              <c:idx val="4"/>
+              <c:layout>
+                <c:manualLayout>
+                  <c:x val="-1.1022929603058264E-2"/>
+                  <c:y val="-3.9254231420694098E-2"/>
+                </c:manualLayout>
+              </c:layout>
+              <c:showVal val="1"/>
+            </c:dLbl>
+            <c:dLbl>
+              <c:idx val="5"/>
+              <c:layout>
+                <c:manualLayout>
+                  <c:x val="-6.613757761834948E-3"/>
+                  <c:y val="-3.5328808278624689E-2"/>
+                </c:manualLayout>
+              </c:layout>
+              <c:showVal val="1"/>
+            </c:dLbl>
+            <c:showVal val="1"/>
+          </c:dLbls>
+          <c:xVal>
+            <c:numRef>
+              <c:f>Arkusz1!$M$27:$M$32</c:f>
+              <c:numCache>
+                <c:formatCode>General</c:formatCode>
+                <c:ptCount val="6"/>
+                <c:pt idx="0">
+                  <c:v>1</c:v>
+                </c:pt>
+                <c:pt idx="1">
+                  <c:v>2</c:v>
+                </c:pt>
+                <c:pt idx="2">
+                  <c:v>3</c:v>
+                </c:pt>
+                <c:pt idx="3">
+                  <c:v>4</c:v>
+                </c:pt>
+                <c:pt idx="4">
+                  <c:v>5</c:v>
+                </c:pt>
+                <c:pt idx="5">
+                  <c:v>6</c:v>
+                </c:pt>
+              </c:numCache>
+            </c:numRef>
+          </c:xVal>
+          <c:yVal>
+            <c:numRef>
+              <c:f>Arkusz1!$R$27:$R$32</c:f>
+              <c:numCache>
+                <c:formatCode>0.00</c:formatCode>
+                <c:ptCount val="6"/>
+                <c:pt idx="0">
+                  <c:v>1</c:v>
+                </c:pt>
+                <c:pt idx="1">
+                  <c:v>1.5751491918433933</c:v>
+                </c:pt>
+                <c:pt idx="2">
+                  <c:v>2.0573537454903152</c:v>
+                </c:pt>
+                <c:pt idx="3">
+                  <c:v>2.434075944294753</c:v>
+                </c:pt>
+                <c:pt idx="4">
+                  <c:v>2.2776259635056739</c:v>
+                </c:pt>
+                <c:pt idx="5">
+                  <c:v>2.1425148843062152</c:v>
+                </c:pt>
+              </c:numCache>
+            </c:numRef>
+          </c:yVal>
+          <c:smooth val="1"/>
+        </c:ser>
+        <c:axId val="49489792"/>
+        <c:axId val="49487872"/>
+      </c:scatterChart>
+      <c:valAx>
+        <c:axId val="49487872"/>
+        <c:scaling>
+          <c:orientation val="minMax"/>
+        </c:scaling>
+        <c:axPos val="l"/>
+        <c:majorGridlines>
+          <c:spPr>
+            <a:ln>
+              <a:solidFill>
+                <a:srgbClr val="B3B3B3"/>
+              </a:solidFill>
+            </a:ln>
+          </c:spPr>
+        </c:majorGridlines>
+        <c:title>
+          <c:tx>
+            <c:rich>
+              <a:bodyPr rot="-5400000" vert="horz"/>
+              <a:lstStyle/>
+              <a:p>
+                <a:pPr>
+                  <a:defRPr sz="1200"/>
+                </a:pPr>
+                <a:r>
+                  <a:rPr lang="pl-PL" sz="1200" baseline="0"/>
+                  <a:t>przyspieszenie  wyboru ruchu</a:t>
+                </a:r>
+              </a:p>
+            </c:rich>
+          </c:tx>
+          <c:layout>
+            <c:manualLayout>
+              <c:xMode val="edge"/>
+              <c:yMode val="edge"/>
+              <c:x val="7.3419654734070599E-3"/>
+              <c:y val="0.18164292867475237"/>
+            </c:manualLayout>
+          </c:layout>
+        </c:title>
+        <c:numFmt formatCode="0.00" sourceLinked="1"/>
+        <c:majorTickMark val="none"/>
+        <c:tickLblPos val="nextTo"/>
+        <c:spPr>
+          <a:ln>
+            <a:solidFill>
+              <a:srgbClr val="B3B3B3"/>
+            </a:solidFill>
+          </a:ln>
+        </c:spPr>
+        <c:txPr>
+          <a:bodyPr/>
+          <a:lstStyle/>
+          <a:p>
+            <a:pPr>
+              <a:defRPr sz="1000" b="0"/>
+            </a:pPr>
+            <a:endParaRPr lang="pl-PL"/>
+          </a:p>
+        </c:txPr>
+        <c:crossAx val="49489792"/>
+        <c:crosses val="autoZero"/>
+        <c:crossBetween val="midCat"/>
+      </c:valAx>
+      <c:valAx>
+        <c:axId val="49489792"/>
+        <c:scaling>
+          <c:orientation val="minMax"/>
+        </c:scaling>
+        <c:axPos val="b"/>
+        <c:majorGridlines/>
+        <c:title>
+          <c:tx>
+            <c:rich>
+              <a:bodyPr/>
+              <a:lstStyle/>
+              <a:p>
+                <a:pPr>
+                  <a:defRPr/>
+                </a:pPr>
+                <a:r>
+                  <a:rPr lang="pl-PL" sz="1200"/>
+                  <a:t>liczba</a:t>
+                </a:r>
+                <a:r>
+                  <a:rPr lang="pl-PL" sz="1200" baseline="0"/>
+                  <a:t> procesów</a:t>
+                </a:r>
+                <a:endParaRPr lang="pl-PL" sz="1200"/>
+              </a:p>
+            </c:rich>
+          </c:tx>
+          <c:layout/>
+        </c:title>
+        <c:numFmt formatCode="General" sourceLinked="1"/>
+        <c:majorTickMark val="none"/>
+        <c:tickLblPos val="nextTo"/>
+        <c:spPr>
+          <a:ln>
+            <a:solidFill>
+              <a:srgbClr val="B3B3B3"/>
+            </a:solidFill>
+          </a:ln>
+        </c:spPr>
+        <c:txPr>
+          <a:bodyPr/>
+          <a:lstStyle/>
+          <a:p>
+            <a:pPr>
+              <a:defRPr sz="1000" b="0"/>
+            </a:pPr>
+            <a:endParaRPr lang="pl-PL"/>
+          </a:p>
+        </c:txPr>
+        <c:crossAx val="49487872"/>
+        <c:crosses val="autoZero"/>
+        <c:crossBetween val="midCat"/>
+      </c:valAx>
+      <c:spPr>
+        <a:noFill/>
+        <a:ln>
+          <a:solidFill>
+            <a:srgbClr val="B3B3B3"/>
+          </a:solidFill>
+          <a:prstDash val="solid"/>
+        </a:ln>
+      </c:spPr>
+    </c:plotArea>
+    <c:plotVisOnly val="1"/>
+  </c:chart>
+  <c:spPr>
+    <a:ln>
+      <a:noFill/>
+    </a:ln>
+  </c:spPr>
+  <c:externalData r:id="rId1"/>
+</c:chartSpace>
 </file>
 
 <file path=ppt/slideLayouts/slideLayout1.xml><?xml version="1.0" encoding="utf-8"?>
@@ -735,7 +1041,7 @@
             <a:fld id="{BE6B1AF5-81A9-48A9-8403-BC957AE8811F}" type="datetimeFigureOut">
               <a:rPr lang="pl-PL" smtClean="0"/>
               <a:pPr/>
-              <a:t>2018-06-15</a:t>
+              <a:t>2018-06-17</a:t>
             </a:fld>
             <a:endParaRPr lang="pl-PL"/>
           </a:p>
@@ -933,7 +1239,7 @@
             <a:fld id="{BE6B1AF5-81A9-48A9-8403-BC957AE8811F}" type="datetimeFigureOut">
               <a:rPr lang="pl-PL" smtClean="0"/>
               <a:pPr/>
-              <a:t>2018-06-15</a:t>
+              <a:t>2018-06-17</a:t>
             </a:fld>
             <a:endParaRPr lang="pl-PL"/>
           </a:p>
@@ -1120,7 +1426,7 @@
             <a:fld id="{BE6B1AF5-81A9-48A9-8403-BC957AE8811F}" type="datetimeFigureOut">
               <a:rPr lang="pl-PL" smtClean="0"/>
               <a:pPr/>
-              <a:t>2018-06-15</a:t>
+              <a:t>2018-06-17</a:t>
             </a:fld>
             <a:endParaRPr lang="pl-PL"/>
           </a:p>
@@ -1272,7 +1578,7 @@
             <a:fld id="{BE6B1AF5-81A9-48A9-8403-BC957AE8811F}" type="datetimeFigureOut">
               <a:rPr lang="pl-PL" smtClean="0"/>
               <a:pPr/>
-              <a:t>2018-06-15</a:t>
+              <a:t>2018-06-17</a:t>
             </a:fld>
             <a:endParaRPr lang="pl-PL"/>
           </a:p>
@@ -1529,7 +1835,7 @@
             <a:fld id="{BE6B1AF5-81A9-48A9-8403-BC957AE8811F}" type="datetimeFigureOut">
               <a:rPr lang="pl-PL" smtClean="0"/>
               <a:pPr/>
-              <a:t>2018-06-15</a:t>
+              <a:t>2018-06-17</a:t>
             </a:fld>
             <a:endParaRPr lang="pl-PL"/>
           </a:p>
@@ -1940,7 +2246,7 @@
             <a:fld id="{BE6B1AF5-81A9-48A9-8403-BC957AE8811F}" type="datetimeFigureOut">
               <a:rPr lang="pl-PL" smtClean="0"/>
               <a:pPr/>
-              <a:t>2018-06-15</a:t>
+              <a:t>2018-06-17</a:t>
             </a:fld>
             <a:endParaRPr lang="pl-PL"/>
           </a:p>
@@ -2388,7 +2694,7 @@
             <a:fld id="{BE6B1AF5-81A9-48A9-8403-BC957AE8811F}" type="datetimeFigureOut">
               <a:rPr lang="pl-PL" smtClean="0"/>
               <a:pPr/>
-              <a:t>2018-06-15</a:t>
+              <a:t>2018-06-17</a:t>
             </a:fld>
             <a:endParaRPr lang="pl-PL"/>
           </a:p>
@@ -2491,7 +2797,7 @@
             <a:fld id="{BE6B1AF5-81A9-48A9-8403-BC957AE8811F}" type="datetimeFigureOut">
               <a:rPr lang="pl-PL" smtClean="0"/>
               <a:pPr/>
-              <a:t>2018-06-15</a:t>
+              <a:t>2018-06-17</a:t>
             </a:fld>
             <a:endParaRPr lang="pl-PL"/>
           </a:p>
@@ -2614,7 +2920,7 @@
             <a:fld id="{BE6B1AF5-81A9-48A9-8403-BC957AE8811F}" type="datetimeFigureOut">
               <a:rPr lang="pl-PL" smtClean="0"/>
               <a:pPr/>
-              <a:t>2018-06-15</a:t>
+              <a:t>2018-06-17</a:t>
             </a:fld>
             <a:endParaRPr lang="pl-PL"/>
           </a:p>
@@ -2890,7 +3196,7 @@
             <a:fld id="{BE6B1AF5-81A9-48A9-8403-BC957AE8811F}" type="datetimeFigureOut">
               <a:rPr lang="pl-PL" smtClean="0"/>
               <a:pPr/>
-              <a:t>2018-06-15</a:t>
+              <a:t>2018-06-17</a:t>
             </a:fld>
             <a:endParaRPr lang="pl-PL"/>
           </a:p>
@@ -3097,7 +3403,7 @@
             <a:fld id="{BE6B1AF5-81A9-48A9-8403-BC957AE8811F}" type="datetimeFigureOut">
               <a:rPr lang="pl-PL" smtClean="0"/>
               <a:pPr/>
-              <a:t>2018-06-15</a:t>
+              <a:t>2018-06-17</a:t>
             </a:fld>
             <a:endParaRPr lang="pl-PL"/>
           </a:p>
@@ -4208,7 +4514,7 @@
             <a:fld id="{BE6B1AF5-81A9-48A9-8403-BC957AE8811F}" type="datetimeFigureOut">
               <a:rPr lang="pl-PL" smtClean="0"/>
               <a:pPr/>
-              <a:t>2018-06-15</a:t>
+              <a:t>2018-06-17</a:t>
             </a:fld>
             <a:endParaRPr lang="pl-PL"/>
           </a:p>
@@ -4628,23 +4934,23 @@
         </p:nvSpPr>
         <p:spPr>
           <a:xfrm>
-            <a:off x="395536" y="1268760"/>
+            <a:off x="467544" y="1988840"/>
             <a:ext cx="8280920" cy="1037673"/>
           </a:xfrm>
         </p:spPr>
         <p:txBody>
           <a:bodyPr>
-            <a:normAutofit/>
+            <a:normAutofit fontScale="90000"/>
           </a:bodyPr>
           <a:lstStyle/>
           <a:p>
             <a:pPr algn="ctr"/>
             <a:r>
               <a:rPr lang="pl-PL" sz="4400" dirty="0" smtClean="0">
-                <a:latin typeface="Calibri" pitchFamily="34" charset="0"/>
-                <a:cs typeface="Calibri" pitchFamily="34" charset="0"/>
+                <a:latin typeface="Calibri" pitchFamily="34"/>
+                <a:cs typeface="Calibri" pitchFamily="34"/>
               </a:rPr>
-              <a:t>TYTUŁ</a:t>
+              <a:t>Zrównoleglenie wyszukiwania najlepszego ruchu w szachach przy użyciu MPI  w języku C#</a:t>
             </a:r>
             <a:endParaRPr lang="pl-PL" sz="4400" dirty="0">
               <a:latin typeface="Calibri" pitchFamily="34" charset="0"/>
@@ -4702,10 +5008,6 @@
               </a:rPr>
               <a:t>Michał Kisielewski</a:t>
             </a:r>
-            <a:endParaRPr lang="pl-PL" sz="2400" dirty="0" smtClean="0">
-              <a:latin typeface="Calibri" pitchFamily="34" charset="0"/>
-              <a:cs typeface="Calibri" pitchFamily="34" charset="0"/>
-            </a:endParaRPr>
           </a:p>
           <a:p>
             <a:endParaRPr lang="pl-PL" sz="3200" dirty="0">
@@ -4762,14 +5064,39 @@
           </a:bodyPr>
           <a:lstStyle/>
           <a:p>
-            <a:pPr>
+            <a:pPr marL="0" lvl="0" indent="0">
+              <a:buFont typeface="Wingdings" pitchFamily="2" charset="2"/>
+              <a:buChar char="§"/>
+            </a:pPr>
+            <a:r>
+              <a:rPr lang="pl-PL" sz="2800" dirty="0" smtClean="0">
+                <a:latin typeface="Calibri" pitchFamily="34" charset="0"/>
+                <a:cs typeface="Calibri" pitchFamily="34" charset="0"/>
+              </a:rPr>
+              <a:t>Wykorzystanie gotowego silnika szachowego korzystającego z algorytmów min-max i alfa-beta</a:t>
+            </a:r>
+          </a:p>
+          <a:p>
+            <a:pPr marL="0" lvl="0" indent="0">
               <a:buNone/>
             </a:pPr>
-            <a:r>
-              <a:rPr lang="pl-PL" dirty="0" err="1" smtClean="0"/>
-              <a:t>akfmadsk</a:t>
-            </a:r>
-            <a:endParaRPr lang="pl-PL" dirty="0" smtClean="0"/>
+            <a:endParaRPr lang="pl-PL" sz="2800" dirty="0" smtClean="0">
+              <a:latin typeface="Calibri" pitchFamily="34" charset="0"/>
+              <a:cs typeface="Calibri" pitchFamily="34" charset="0"/>
+            </a:endParaRPr>
+          </a:p>
+          <a:p>
+            <a:pPr marL="0" indent="0">
+              <a:buFont typeface="Wingdings" pitchFamily="2" charset="2"/>
+              <a:buChar char="§"/>
+            </a:pPr>
+            <a:r>
+              <a:rPr lang="pl-PL" sz="2800" dirty="0" smtClean="0">
+                <a:latin typeface="Calibri" pitchFamily="34" charset="0"/>
+                <a:cs typeface="Calibri" pitchFamily="34" charset="0"/>
+              </a:rPr>
+              <a:t>Użycie MPI do zrównoleglenia wyszukiwania</a:t>
+            </a:r>
           </a:p>
           <a:p>
             <a:pPr>
@@ -4780,13 +5107,6 @@
           </a:p>
           <a:p>
             <a:pPr>
-              <a:buFont typeface="Wingdings" pitchFamily="2" charset="2"/>
-              <a:buChar char="§"/>
-            </a:pPr>
-            <a:endParaRPr lang="pl-PL" dirty="0" smtClean="0"/>
-          </a:p>
-          <a:p>
-            <a:pPr>
               <a:buNone/>
             </a:pPr>
             <a:endParaRPr lang="pl-PL" dirty="0" smtClean="0"/>
@@ -4823,12 +5143,14 @@
             <a:pPr algn="ctr"/>
             <a:r>
               <a:rPr lang="pl-PL" sz="3200" dirty="0" smtClean="0">
+                <a:effectLst/>
                 <a:latin typeface="Calibri" pitchFamily="34" charset="0"/>
                 <a:cs typeface="Calibri" pitchFamily="34" charset="0"/>
               </a:rPr>
-              <a:t>Coś tam</a:t>
+              <a:t>Opis projektu</a:t>
             </a:r>
             <a:endParaRPr lang="pl-PL" sz="3200" dirty="0">
+              <a:effectLst/>
               <a:latin typeface="Calibri" pitchFamily="34" charset="0"/>
               <a:cs typeface="Calibri" pitchFamily="34" charset="0"/>
             </a:endParaRPr>
@@ -4844,6 +5166,744 @@
 </file>
 
 <file path=ppt/slides/slide3.xml><?xml version="1.0" encoding="utf-8"?>
+<p:sld xmlns:a="http://schemas.openxmlformats.org/drawingml/2006/main" xmlns:r="http://schemas.openxmlformats.org/officeDocument/2006/relationships" xmlns:p="http://schemas.openxmlformats.org/presentationml/2006/main">
+  <p:cSld>
+    <p:spTree>
+      <p:nvGrpSpPr>
+        <p:cNvPr id="1" name=""/>
+        <p:cNvGrpSpPr/>
+        <p:nvPr/>
+      </p:nvGrpSpPr>
+      <p:grpSpPr>
+        <a:xfrm>
+          <a:off x="0" y="0"/>
+          <a:ext cx="0" cy="0"/>
+          <a:chOff x="0" y="0"/>
+          <a:chExt cx="0" cy="0"/>
+        </a:xfrm>
+      </p:grpSpPr>
+      <p:sp>
+        <p:nvSpPr>
+          <p:cNvPr id="2" name="Symbol zastępczy zawartości 1"/>
+          <p:cNvSpPr>
+            <a:spLocks noGrp="1"/>
+          </p:cNvSpPr>
+          <p:nvPr>
+            <p:ph idx="1"/>
+          </p:nvPr>
+        </p:nvSpPr>
+        <p:spPr/>
+        <p:txBody>
+          <a:bodyPr>
+            <a:normAutofit fontScale="70000" lnSpcReduction="20000"/>
+          </a:bodyPr>
+          <a:lstStyle/>
+          <a:p>
+            <a:r>
+              <a:rPr lang="pl-PL" sz="3500" dirty="0" smtClean="0">
+                <a:latin typeface="Calibri" pitchFamily="34" charset="0"/>
+                <a:cs typeface="Calibri" pitchFamily="34" charset="0"/>
+              </a:rPr>
+              <a:t>Użyty został algorytm min-max, który jest algorytmem rekurencyjnym</a:t>
+            </a:r>
+          </a:p>
+          <a:p>
+            <a:endParaRPr lang="pl-PL" sz="3500" dirty="0" smtClean="0">
+              <a:latin typeface="Calibri" pitchFamily="34" charset="0"/>
+              <a:cs typeface="Calibri" pitchFamily="34" charset="0"/>
+            </a:endParaRPr>
+          </a:p>
+          <a:p>
+            <a:r>
+              <a:rPr lang="pl-PL" sz="3500" dirty="0" smtClean="0">
+                <a:latin typeface="Calibri" pitchFamily="34" charset="0"/>
+                <a:cs typeface="Calibri" pitchFamily="34" charset="0"/>
+              </a:rPr>
+              <a:t>Do optymalizacji działania algorytmu min-max został zastosowany algorytm </a:t>
+            </a:r>
+            <a:r>
+              <a:rPr lang="pl-PL" sz="3500" dirty="0" err="1" smtClean="0">
+                <a:latin typeface="Calibri" pitchFamily="34" charset="0"/>
+                <a:cs typeface="Calibri" pitchFamily="34" charset="0"/>
+              </a:rPr>
+              <a:t>alpha-beta</a:t>
+            </a:r>
+            <a:endParaRPr lang="pl-PL" sz="3500" dirty="0" smtClean="0">
+              <a:latin typeface="Calibri" pitchFamily="34" charset="0"/>
+              <a:cs typeface="Calibri" pitchFamily="34" charset="0"/>
+            </a:endParaRPr>
+          </a:p>
+          <a:p>
+            <a:endParaRPr lang="pl-PL" sz="3500" dirty="0" smtClean="0">
+              <a:latin typeface="Calibri" pitchFamily="34" charset="0"/>
+              <a:cs typeface="Calibri" pitchFamily="34" charset="0"/>
+            </a:endParaRPr>
+          </a:p>
+          <a:p>
+            <a:r>
+              <a:rPr lang="pl-PL" sz="3500" dirty="0" smtClean="0">
+                <a:latin typeface="Calibri" pitchFamily="34" charset="0"/>
+                <a:cs typeface="Calibri" pitchFamily="34" charset="0"/>
+              </a:rPr>
+              <a:t>Algorytm analizuje dostępne ruchy i tworzy na ich podstawie drzewo, gdzie węzły to stany planszy, a krawędzie to ruchy jednego z graczy</a:t>
+            </a:r>
+          </a:p>
+          <a:p>
+            <a:pPr>
+              <a:buNone/>
+            </a:pPr>
+            <a:endParaRPr lang="pl-PL" sz="3500" dirty="0" smtClean="0">
+              <a:latin typeface="Calibri" pitchFamily="34" charset="0"/>
+              <a:cs typeface="Calibri" pitchFamily="34" charset="0"/>
+            </a:endParaRPr>
+          </a:p>
+          <a:p>
+            <a:r>
+              <a:rPr lang="pl-PL" sz="3500" dirty="0" smtClean="0">
+                <a:latin typeface="Calibri" pitchFamily="34" charset="0"/>
+                <a:cs typeface="Calibri" pitchFamily="34" charset="0"/>
+              </a:rPr>
+              <a:t>Czas trwania algorytmu wyszukiwania optymalnego rozwiązania drastycznie rośnie wraz z ilością przeszukiwanych wgłęb ruchów</a:t>
+            </a:r>
+          </a:p>
+          <a:p>
+            <a:endParaRPr lang="pl-PL" dirty="0" smtClean="0"/>
+          </a:p>
+          <a:p>
+            <a:endParaRPr lang="pl-PL" dirty="0" smtClean="0"/>
+          </a:p>
+          <a:p>
+            <a:endParaRPr lang="pl-PL" dirty="0"/>
+          </a:p>
+        </p:txBody>
+      </p:sp>
+      <p:sp>
+        <p:nvSpPr>
+          <p:cNvPr id="3" name="Tytuł 2"/>
+          <p:cNvSpPr>
+            <a:spLocks noGrp="1"/>
+          </p:cNvSpPr>
+          <p:nvPr>
+            <p:ph type="title"/>
+          </p:nvPr>
+        </p:nvSpPr>
+        <p:spPr/>
+        <p:txBody>
+          <a:bodyPr>
+            <a:normAutofit/>
+          </a:bodyPr>
+          <a:lstStyle/>
+          <a:p>
+            <a:pPr algn="ctr"/>
+            <a:r>
+              <a:rPr lang="pl-PL" sz="3200" dirty="0" smtClean="0">
+                <a:latin typeface="Calibri" pitchFamily="34" charset="0"/>
+                <a:cs typeface="Calibri" pitchFamily="34" charset="0"/>
+              </a:rPr>
+              <a:t>Algorytm</a:t>
+            </a:r>
+            <a:endParaRPr lang="pl-PL" sz="3200" dirty="0">
+              <a:latin typeface="Calibri" pitchFamily="34" charset="0"/>
+              <a:cs typeface="Calibri" pitchFamily="34" charset="0"/>
+            </a:endParaRPr>
+          </a:p>
+        </p:txBody>
+      </p:sp>
+    </p:spTree>
+  </p:cSld>
+  <p:clrMapOvr>
+    <a:masterClrMapping/>
+  </p:clrMapOvr>
+</p:sld>
+</file>
+
+<file path=ppt/slides/slide4.xml><?xml version="1.0" encoding="utf-8"?>
+<p:sld xmlns:a="http://schemas.openxmlformats.org/drawingml/2006/main" xmlns:r="http://schemas.openxmlformats.org/officeDocument/2006/relationships" xmlns:p="http://schemas.openxmlformats.org/presentationml/2006/main">
+  <p:cSld>
+    <p:spTree>
+      <p:nvGrpSpPr>
+        <p:cNvPr id="1" name=""/>
+        <p:cNvGrpSpPr/>
+        <p:nvPr/>
+      </p:nvGrpSpPr>
+      <p:grpSpPr>
+        <a:xfrm>
+          <a:off x="0" y="0"/>
+          <a:ext cx="0" cy="0"/>
+          <a:chOff x="0" y="0"/>
+          <a:chExt cx="0" cy="0"/>
+        </a:xfrm>
+      </p:grpSpPr>
+      <p:sp>
+        <p:nvSpPr>
+          <p:cNvPr id="3" name="Tytuł 2"/>
+          <p:cNvSpPr>
+            <a:spLocks noGrp="1"/>
+          </p:cNvSpPr>
+          <p:nvPr>
+            <p:ph type="title"/>
+          </p:nvPr>
+        </p:nvSpPr>
+        <p:spPr/>
+        <p:txBody>
+          <a:bodyPr>
+            <a:normAutofit/>
+          </a:bodyPr>
+          <a:lstStyle/>
+          <a:p>
+            <a:pPr algn="ctr"/>
+            <a:r>
+              <a:rPr lang="pl-PL" sz="3200" dirty="0" smtClean="0">
+                <a:latin typeface="Calibri" pitchFamily="34" charset="0"/>
+                <a:cs typeface="Calibri" pitchFamily="34" charset="0"/>
+              </a:rPr>
+              <a:t>Drzewo rozwiązań</a:t>
+            </a:r>
+            <a:endParaRPr lang="pl-PL" sz="3200" dirty="0">
+              <a:latin typeface="Calibri" pitchFamily="34" charset="0"/>
+              <a:cs typeface="Calibri" pitchFamily="34" charset="0"/>
+            </a:endParaRPr>
+          </a:p>
+        </p:txBody>
+      </p:sp>
+      <p:pic>
+        <p:nvPicPr>
+          <p:cNvPr id="1026" name="Picture 2"/>
+          <p:cNvPicPr>
+            <a:picLocks noGrp="1" noChangeAspect="1" noChangeArrowheads="1"/>
+          </p:cNvPicPr>
+          <p:nvPr>
+            <p:ph idx="1"/>
+          </p:nvPr>
+        </p:nvPicPr>
+        <p:blipFill>
+          <a:blip r:embed="rId2" cstate="print"/>
+          <a:srcRect/>
+          <a:stretch>
+            <a:fillRect/>
+          </a:stretch>
+        </p:blipFill>
+        <p:spPr bwMode="auto">
+          <a:xfrm>
+            <a:off x="1475656" y="1988840"/>
+            <a:ext cx="5849162" cy="3264917"/>
+          </a:xfrm>
+          <a:prstGeom prst="rect">
+            <a:avLst/>
+          </a:prstGeom>
+          <a:noFill/>
+          <a:ln w="9525">
+            <a:noFill/>
+            <a:miter lim="800000"/>
+            <a:headEnd/>
+            <a:tailEnd/>
+          </a:ln>
+        </p:spPr>
+      </p:pic>
+    </p:spTree>
+  </p:cSld>
+  <p:clrMapOvr>
+    <a:masterClrMapping/>
+  </p:clrMapOvr>
+</p:sld>
+</file>
+
+<file path=ppt/slides/slide5.xml><?xml version="1.0" encoding="utf-8"?>
+<p:sld xmlns:a="http://schemas.openxmlformats.org/drawingml/2006/main" xmlns:r="http://schemas.openxmlformats.org/officeDocument/2006/relationships" xmlns:p="http://schemas.openxmlformats.org/presentationml/2006/main">
+  <p:cSld>
+    <p:spTree>
+      <p:nvGrpSpPr>
+        <p:cNvPr id="1" name=""/>
+        <p:cNvGrpSpPr/>
+        <p:nvPr/>
+      </p:nvGrpSpPr>
+      <p:grpSpPr>
+        <a:xfrm>
+          <a:off x="0" y="0"/>
+          <a:ext cx="0" cy="0"/>
+          <a:chOff x="0" y="0"/>
+          <a:chExt cx="0" cy="0"/>
+        </a:xfrm>
+      </p:grpSpPr>
+      <p:sp>
+        <p:nvSpPr>
+          <p:cNvPr id="2" name="Symbol zastępczy zawartości 1"/>
+          <p:cNvSpPr>
+            <a:spLocks noGrp="1"/>
+          </p:cNvSpPr>
+          <p:nvPr>
+            <p:ph idx="1"/>
+          </p:nvPr>
+        </p:nvSpPr>
+        <p:spPr/>
+        <p:txBody>
+          <a:bodyPr>
+            <a:normAutofit/>
+          </a:bodyPr>
+          <a:lstStyle/>
+          <a:p>
+            <a:pPr>
+              <a:buFont typeface="Wingdings" pitchFamily="2" charset="2"/>
+              <a:buChar char="§"/>
+            </a:pPr>
+            <a:r>
+              <a:rPr lang="pl-PL" sz="2400" dirty="0" smtClean="0">
+                <a:latin typeface="Calibri" pitchFamily="34" charset="0"/>
+                <a:cs typeface="Calibri" pitchFamily="34" charset="0"/>
+              </a:rPr>
+              <a:t>Wyszukiwanie ruchów odbywa się poprzez podliczenie punktów uzyskanych poprzez wykonanie ruchu</a:t>
+            </a:r>
+          </a:p>
+          <a:p>
+            <a:pPr>
+              <a:buFont typeface="Wingdings" pitchFamily="2" charset="2"/>
+              <a:buChar char="§"/>
+            </a:pPr>
+            <a:endParaRPr lang="pl-PL" sz="2400" dirty="0" smtClean="0">
+              <a:latin typeface="Calibri" pitchFamily="34" charset="0"/>
+              <a:cs typeface="Calibri" pitchFamily="34" charset="0"/>
+            </a:endParaRPr>
+          </a:p>
+          <a:p>
+            <a:pPr>
+              <a:buFont typeface="Wingdings" pitchFamily="2" charset="2"/>
+              <a:buChar char="§"/>
+            </a:pPr>
+            <a:r>
+              <a:rPr lang="pl-PL" sz="2400" dirty="0" smtClean="0">
+                <a:latin typeface="Calibri" pitchFamily="34" charset="0"/>
+                <a:cs typeface="Calibri" pitchFamily="34" charset="0"/>
+              </a:rPr>
+              <a:t>Każdy typ bierki ma określoną wagę, która określa jak wartościowa jest dla danego gracza</a:t>
+            </a:r>
+          </a:p>
+          <a:p>
+            <a:pPr>
+              <a:buFont typeface="Wingdings" pitchFamily="2" charset="2"/>
+              <a:buChar char="§"/>
+            </a:pPr>
+            <a:endParaRPr lang="pl-PL" sz="2400" dirty="0" smtClean="0">
+              <a:latin typeface="Calibri" pitchFamily="34" charset="0"/>
+              <a:cs typeface="Calibri" pitchFamily="34" charset="0"/>
+            </a:endParaRPr>
+          </a:p>
+          <a:p>
+            <a:pPr>
+              <a:buFont typeface="Wingdings" pitchFamily="2" charset="2"/>
+              <a:buChar char="§"/>
+            </a:pPr>
+            <a:r>
+              <a:rPr lang="pl-PL" sz="2400" dirty="0" smtClean="0">
+                <a:latin typeface="Calibri" pitchFamily="34" charset="0"/>
+                <a:cs typeface="Calibri" pitchFamily="34" charset="0"/>
+              </a:rPr>
+              <a:t>Oprócz wag bierek występują także wagi przypisywane określonym pozycjom danej bierki na planszy</a:t>
+            </a:r>
+            <a:endParaRPr lang="pl-PL" sz="2400" dirty="0">
+              <a:latin typeface="Calibri" pitchFamily="34" charset="0"/>
+              <a:cs typeface="Calibri" pitchFamily="34" charset="0"/>
+            </a:endParaRPr>
+          </a:p>
+        </p:txBody>
+      </p:sp>
+      <p:sp>
+        <p:nvSpPr>
+          <p:cNvPr id="3" name="Tytuł 2"/>
+          <p:cNvSpPr>
+            <a:spLocks noGrp="1"/>
+          </p:cNvSpPr>
+          <p:nvPr>
+            <p:ph type="title"/>
+          </p:nvPr>
+        </p:nvSpPr>
+        <p:spPr/>
+        <p:txBody>
+          <a:bodyPr>
+            <a:normAutofit/>
+          </a:bodyPr>
+          <a:lstStyle/>
+          <a:p>
+            <a:pPr algn="ctr"/>
+            <a:r>
+              <a:rPr lang="pl-PL" sz="3200" dirty="0" smtClean="0">
+                <a:latin typeface="Calibri" pitchFamily="34" charset="0"/>
+                <a:cs typeface="Calibri" pitchFamily="34" charset="0"/>
+              </a:rPr>
+              <a:t>Kryteria wyszukiwania ruchu</a:t>
+            </a:r>
+            <a:endParaRPr lang="pl-PL" sz="3200" dirty="0">
+              <a:latin typeface="Calibri" pitchFamily="34" charset="0"/>
+              <a:cs typeface="Calibri" pitchFamily="34" charset="0"/>
+            </a:endParaRPr>
+          </a:p>
+        </p:txBody>
+      </p:sp>
+    </p:spTree>
+  </p:cSld>
+  <p:clrMapOvr>
+    <a:masterClrMapping/>
+  </p:clrMapOvr>
+</p:sld>
+</file>
+
+<file path=ppt/slides/slide6.xml><?xml version="1.0" encoding="utf-8"?>
+<p:sld xmlns:a="http://schemas.openxmlformats.org/drawingml/2006/main" xmlns:r="http://schemas.openxmlformats.org/officeDocument/2006/relationships" xmlns:p="http://schemas.openxmlformats.org/presentationml/2006/main">
+  <p:cSld>
+    <p:spTree>
+      <p:nvGrpSpPr>
+        <p:cNvPr id="1" name=""/>
+        <p:cNvGrpSpPr/>
+        <p:nvPr/>
+      </p:nvGrpSpPr>
+      <p:grpSpPr>
+        <a:xfrm>
+          <a:off x="0" y="0"/>
+          <a:ext cx="0" cy="0"/>
+          <a:chOff x="0" y="0"/>
+          <a:chExt cx="0" cy="0"/>
+        </a:xfrm>
+      </p:grpSpPr>
+      <p:sp>
+        <p:nvSpPr>
+          <p:cNvPr id="2" name="Symbol zastępczy zawartości 1"/>
+          <p:cNvSpPr>
+            <a:spLocks noGrp="1"/>
+          </p:cNvSpPr>
+          <p:nvPr>
+            <p:ph idx="1"/>
+          </p:nvPr>
+        </p:nvSpPr>
+        <p:spPr/>
+        <p:txBody>
+          <a:bodyPr>
+            <a:normAutofit fontScale="92500" lnSpcReduction="10000"/>
+          </a:bodyPr>
+          <a:lstStyle/>
+          <a:p>
+            <a:r>
+              <a:rPr lang="pl-PL" sz="2000" dirty="0" smtClean="0">
+                <a:latin typeface="Calibri" pitchFamily="34" charset="0"/>
+                <a:cs typeface="Calibri" pitchFamily="34" charset="0"/>
+              </a:rPr>
+              <a:t>Proces główny (</a:t>
+            </a:r>
+            <a:r>
+              <a:rPr lang="pl-PL" sz="2000" dirty="0" err="1" smtClean="0">
+                <a:latin typeface="Calibri" pitchFamily="34" charset="0"/>
+                <a:cs typeface="Calibri" pitchFamily="34" charset="0"/>
+              </a:rPr>
+              <a:t>rank</a:t>
+            </a:r>
+            <a:r>
+              <a:rPr lang="pl-PL" sz="2000" dirty="0" smtClean="0">
+                <a:latin typeface="Calibri" pitchFamily="34" charset="0"/>
+                <a:cs typeface="Calibri" pitchFamily="34" charset="0"/>
+              </a:rPr>
+              <a:t> 0) oprócz obliczeń związanych z własną częścią potencjalnych rozwiązań zajmuje się samą inicjalizacją i obsługą programu oraz przygotowaniem danych do wysłania innym procesom</a:t>
+            </a:r>
+          </a:p>
+          <a:p>
+            <a:endParaRPr lang="pl-PL" sz="2000" dirty="0" smtClean="0">
+              <a:latin typeface="Calibri" pitchFamily="34" charset="0"/>
+              <a:cs typeface="Calibri" pitchFamily="34" charset="0"/>
+            </a:endParaRPr>
+          </a:p>
+          <a:p>
+            <a:r>
+              <a:rPr lang="pl-PL" sz="2000" dirty="0" smtClean="0">
+                <a:latin typeface="Calibri" pitchFamily="34" charset="0"/>
+                <a:cs typeface="Calibri" pitchFamily="34" charset="0"/>
+              </a:rPr>
+              <a:t>Ruchy do sprawdzenia są dzielone możliwie równo na części, których liczba jest równa liczbie procesów</a:t>
+            </a:r>
+          </a:p>
+          <a:p>
+            <a:endParaRPr lang="pl-PL" sz="2000" dirty="0" smtClean="0">
+              <a:latin typeface="Calibri" pitchFamily="34" charset="0"/>
+              <a:cs typeface="Calibri" pitchFamily="34" charset="0"/>
+            </a:endParaRPr>
+          </a:p>
+          <a:p>
+            <a:r>
+              <a:rPr lang="pl-PL" sz="2000" dirty="0" smtClean="0">
+                <a:latin typeface="Calibri" pitchFamily="34" charset="0"/>
+                <a:cs typeface="Calibri" pitchFamily="34" charset="0"/>
+              </a:rPr>
+              <a:t>Paczki danych zawierające wszystkie niezbędne dane do obliczenia optymalnego rozwiązania zostają wysłane do odpowiednich procesów</a:t>
+            </a:r>
+          </a:p>
+          <a:p>
+            <a:endParaRPr lang="pl-PL" sz="2000" dirty="0" smtClean="0">
+              <a:latin typeface="Calibri" pitchFamily="34" charset="0"/>
+              <a:cs typeface="Calibri" pitchFamily="34" charset="0"/>
+            </a:endParaRPr>
+          </a:p>
+          <a:p>
+            <a:r>
+              <a:rPr lang="pl-PL" sz="2000" dirty="0" smtClean="0">
+                <a:latin typeface="Calibri" pitchFamily="34" charset="0"/>
+                <a:cs typeface="Calibri" pitchFamily="34" charset="0"/>
+              </a:rPr>
+              <a:t>Wszystkie procesy równolegle szukają optymalnego rozwiązania na podstawie otrzymanych danych</a:t>
+            </a:r>
+          </a:p>
+          <a:p>
+            <a:endParaRPr lang="pl-PL" sz="2000" dirty="0" smtClean="0">
+              <a:latin typeface="Calibri" pitchFamily="34" charset="0"/>
+              <a:cs typeface="Calibri" pitchFamily="34" charset="0"/>
+            </a:endParaRPr>
+          </a:p>
+          <a:p>
+            <a:r>
+              <a:rPr lang="pl-PL" sz="2000" dirty="0" smtClean="0">
+                <a:latin typeface="Calibri" pitchFamily="34" charset="0"/>
+                <a:cs typeface="Calibri" pitchFamily="34" charset="0"/>
+              </a:rPr>
+              <a:t>Najlepsze wartości oraz ruchy im odpowiadające są pod koniec wysyłane do głównego procesu, który analizuje je i wybiera najlepszy ruch</a:t>
+            </a:r>
+            <a:endParaRPr lang="pl-PL" sz="2000" dirty="0">
+              <a:latin typeface="Calibri" pitchFamily="34" charset="0"/>
+              <a:cs typeface="Calibri" pitchFamily="34" charset="0"/>
+            </a:endParaRPr>
+          </a:p>
+        </p:txBody>
+      </p:sp>
+      <p:sp>
+        <p:nvSpPr>
+          <p:cNvPr id="3" name="Tytuł 2"/>
+          <p:cNvSpPr>
+            <a:spLocks noGrp="1"/>
+          </p:cNvSpPr>
+          <p:nvPr>
+            <p:ph type="title"/>
+          </p:nvPr>
+        </p:nvSpPr>
+        <p:spPr/>
+        <p:txBody>
+          <a:bodyPr>
+            <a:normAutofit/>
+          </a:bodyPr>
+          <a:lstStyle/>
+          <a:p>
+            <a:pPr algn="ctr"/>
+            <a:r>
+              <a:rPr lang="pl-PL" sz="3200" dirty="0" smtClean="0">
+                <a:effectLst/>
+                <a:latin typeface="Calibri" pitchFamily="34" charset="0"/>
+                <a:cs typeface="Calibri" pitchFamily="34" charset="0"/>
+              </a:rPr>
+              <a:t>Działanie programu</a:t>
+            </a:r>
+            <a:endParaRPr lang="pl-PL" sz="3200" dirty="0">
+              <a:effectLst/>
+              <a:latin typeface="Calibri" pitchFamily="34" charset="0"/>
+              <a:cs typeface="Calibri" pitchFamily="34" charset="0"/>
+            </a:endParaRPr>
+          </a:p>
+        </p:txBody>
+      </p:sp>
+    </p:spTree>
+  </p:cSld>
+  <p:clrMapOvr>
+    <a:masterClrMapping/>
+  </p:clrMapOvr>
+</p:sld>
+</file>
+
+<file path=ppt/slides/slide7.xml><?xml version="1.0" encoding="utf-8"?>
+<p:sld xmlns:a="http://schemas.openxmlformats.org/drawingml/2006/main" xmlns:r="http://schemas.openxmlformats.org/officeDocument/2006/relationships" xmlns:p="http://schemas.openxmlformats.org/presentationml/2006/main">
+  <p:cSld>
+    <p:spTree>
+      <p:nvGrpSpPr>
+        <p:cNvPr id="1" name=""/>
+        <p:cNvGrpSpPr/>
+        <p:nvPr/>
+      </p:nvGrpSpPr>
+      <p:grpSpPr>
+        <a:xfrm>
+          <a:off x="0" y="0"/>
+          <a:ext cx="0" cy="0"/>
+          <a:chOff x="0" y="0"/>
+          <a:chExt cx="0" cy="0"/>
+        </a:xfrm>
+      </p:grpSpPr>
+      <p:sp>
+        <p:nvSpPr>
+          <p:cNvPr id="3" name="Tytuł 2"/>
+          <p:cNvSpPr>
+            <a:spLocks noGrp="1"/>
+          </p:cNvSpPr>
+          <p:nvPr>
+            <p:ph type="title"/>
+          </p:nvPr>
+        </p:nvSpPr>
+        <p:spPr/>
+        <p:txBody>
+          <a:bodyPr>
+            <a:normAutofit/>
+          </a:bodyPr>
+          <a:lstStyle/>
+          <a:p>
+            <a:pPr algn="ctr"/>
+            <a:r>
+              <a:rPr lang="pl-PL" sz="3200" b="0" dirty="0" smtClean="0">
+                <a:latin typeface="Calibri" pitchFamily="34" charset="0"/>
+                <a:cs typeface="Calibri" pitchFamily="34" charset="0"/>
+              </a:rPr>
+              <a:t>Interfejs użytkownika</a:t>
+            </a:r>
+            <a:endParaRPr lang="pl-PL" sz="3200" dirty="0">
+              <a:latin typeface="Calibri" pitchFamily="34" charset="0"/>
+              <a:cs typeface="Calibri" pitchFamily="34" charset="0"/>
+            </a:endParaRPr>
+          </a:p>
+        </p:txBody>
+      </p:sp>
+      <p:pic>
+        <p:nvPicPr>
+          <p:cNvPr id="4" name="Symbol zastępczy zawartości 3"/>
+          <p:cNvPicPr>
+            <a:picLocks noGrp="1"/>
+          </p:cNvPicPr>
+          <p:nvPr>
+            <p:ph idx="1"/>
+          </p:nvPr>
+        </p:nvPicPr>
+        <p:blipFill>
+          <a:blip r:embed="rId2" cstate="print"/>
+          <a:srcRect/>
+          <a:stretch>
+            <a:fillRect/>
+          </a:stretch>
+        </p:blipFill>
+        <p:spPr bwMode="auto">
+          <a:xfrm>
+            <a:off x="1763688" y="1916832"/>
+            <a:ext cx="5757813" cy="3692773"/>
+          </a:xfrm>
+          <a:prstGeom prst="rect">
+            <a:avLst/>
+          </a:prstGeom>
+          <a:noFill/>
+          <a:ln w="9525">
+            <a:noFill/>
+            <a:miter lim="800000"/>
+            <a:headEnd/>
+            <a:tailEnd/>
+          </a:ln>
+        </p:spPr>
+      </p:pic>
+    </p:spTree>
+  </p:cSld>
+  <p:clrMapOvr>
+    <a:masterClrMapping/>
+  </p:clrMapOvr>
+</p:sld>
+</file>
+
+<file path=ppt/slides/slide8.xml><?xml version="1.0" encoding="utf-8"?>
+<p:sld xmlns:a="http://schemas.openxmlformats.org/drawingml/2006/main" xmlns:r="http://schemas.openxmlformats.org/officeDocument/2006/relationships" xmlns:p="http://schemas.openxmlformats.org/presentationml/2006/main">
+  <p:cSld>
+    <p:spTree>
+      <p:nvGrpSpPr>
+        <p:cNvPr id="1" name=""/>
+        <p:cNvGrpSpPr/>
+        <p:nvPr/>
+      </p:nvGrpSpPr>
+      <p:grpSpPr>
+        <a:xfrm>
+          <a:off x="0" y="0"/>
+          <a:ext cx="0" cy="0"/>
+          <a:chOff x="0" y="0"/>
+          <a:chExt cx="0" cy="0"/>
+        </a:xfrm>
+      </p:grpSpPr>
+      <p:sp>
+        <p:nvSpPr>
+          <p:cNvPr id="2" name="Symbol zastępczy zawartości 1"/>
+          <p:cNvSpPr>
+            <a:spLocks noGrp="1"/>
+          </p:cNvSpPr>
+          <p:nvPr>
+            <p:ph idx="1"/>
+          </p:nvPr>
+        </p:nvSpPr>
+        <p:spPr/>
+        <p:txBody>
+          <a:bodyPr>
+            <a:normAutofit/>
+          </a:bodyPr>
+          <a:lstStyle/>
+          <a:p>
+            <a:pPr marL="0" lvl="0" indent="0">
+              <a:buNone/>
+            </a:pPr>
+            <a:endParaRPr lang="pl-PL" dirty="0" smtClean="0">
+              <a:latin typeface="Lucida Sans Unicode" pitchFamily="18"/>
+            </a:endParaRPr>
+          </a:p>
+          <a:p>
+            <a:endParaRPr lang="pl-PL" dirty="0"/>
+          </a:p>
+        </p:txBody>
+      </p:sp>
+      <p:sp>
+        <p:nvSpPr>
+          <p:cNvPr id="3" name="Tytuł 2"/>
+          <p:cNvSpPr>
+            <a:spLocks noGrp="1"/>
+          </p:cNvSpPr>
+          <p:nvPr>
+            <p:ph type="title"/>
+          </p:nvPr>
+        </p:nvSpPr>
+        <p:spPr/>
+        <p:txBody>
+          <a:bodyPr>
+            <a:normAutofit/>
+          </a:bodyPr>
+          <a:lstStyle/>
+          <a:p>
+            <a:pPr algn="ctr"/>
+            <a:r>
+              <a:rPr lang="pl-PL" sz="3200" b="0" dirty="0" smtClean="0">
+                <a:latin typeface="Calibri" pitchFamily="34" charset="0"/>
+                <a:cs typeface="Calibri" pitchFamily="34" charset="0"/>
+              </a:rPr>
+              <a:t>Wyniki zrównoleglenia</a:t>
+            </a:r>
+            <a:endParaRPr lang="pl-PL" sz="3200" dirty="0">
+              <a:latin typeface="Calibri" pitchFamily="34" charset="0"/>
+              <a:cs typeface="Calibri" pitchFamily="34" charset="0"/>
+            </a:endParaRPr>
+          </a:p>
+        </p:txBody>
+      </p:sp>
+      <p:graphicFrame>
+        <p:nvGraphicFramePr>
+          <p:cNvPr id="4" name="Wykres 3"/>
+          <p:cNvGraphicFramePr/>
+          <p:nvPr/>
+        </p:nvGraphicFramePr>
+        <p:xfrm>
+          <a:off x="1331640" y="1772816"/>
+          <a:ext cx="6480760" cy="3921916"/>
+        </p:xfrm>
+        <a:graphic>
+          <a:graphicData uri="http://schemas.openxmlformats.org/drawingml/2006/chart">
+            <c:chart xmlns:c="http://schemas.openxmlformats.org/drawingml/2006/chart" xmlns:r="http://schemas.openxmlformats.org/officeDocument/2006/relationships" r:id="rId2"/>
+          </a:graphicData>
+        </a:graphic>
+      </p:graphicFrame>
+    </p:spTree>
+  </p:cSld>
+  <p:clrMapOvr>
+    <a:masterClrMapping/>
+  </p:clrMapOvr>
+</p:sld>
+</file>
+
+<file path=ppt/slides/slide9.xml><?xml version="1.0" encoding="utf-8"?>
 <p:sld xmlns:a="http://schemas.openxmlformats.org/drawingml/2006/main" xmlns:r="http://schemas.openxmlformats.org/officeDocument/2006/relationships" xmlns:p="http://schemas.openxmlformats.org/presentationml/2006/main">
   <p:cSld>
     <p:spTree>

</xml_diff>

<commit_message>
Add content and fix
</commit_message>
<xml_diff>
--- a/Documentation/PRIR_prezentacja_Antas_Kisielewski.pptx
+++ b/Documentation/PRIR_prezentacja_Antas_Kisielewski.pptx
@@ -128,8 +128,8 @@
           <c:xMode val="edge"/>
           <c:yMode val="edge"/>
           <c:x val="0.13421796827791821"/>
-          <c:y val="8.7503245428582038E-2"/>
-          <c:w val="0.80732821718955705"/>
+          <c:y val="8.7503245428582052E-2"/>
+          <c:w val="0.80732821718955716"/>
           <c:h val="0.73598001110494171"/>
         </c:manualLayout>
       </c:layout>
@@ -159,8 +159,8 @@
               <c:idx val="0"/>
               <c:layout>
                 <c:manualLayout>
-                  <c:x val="-7.0546749459572677E-2"/>
-                  <c:y val="-3.5328808278624689E-2"/>
+                  <c:x val="-7.0546749459572691E-2"/>
+                  <c:y val="-3.5328808278624696E-2"/>
                 </c:manualLayout>
               </c:layout>
               <c:showVal val="1"/>
@@ -169,8 +169,8 @@
               <c:idx val="1"/>
               <c:layout>
                 <c:manualLayout>
-                  <c:x val="-6.6137577618349402E-2"/>
-                  <c:y val="-3.5328808278624689E-2"/>
+                  <c:x val="-6.6137577618349416E-2"/>
+                  <c:y val="-3.5328808278624696E-2"/>
                 </c:manualLayout>
               </c:layout>
               <c:showVal val="1"/>
@@ -179,8 +179,8 @@
               <c:idx val="2"/>
               <c:layout>
                 <c:manualLayout>
-                  <c:x val="-7.0546749459572677E-2"/>
-                  <c:y val="-3.1403385136555259E-2"/>
+                  <c:x val="-7.0546749459572691E-2"/>
+                  <c:y val="-3.1403385136555266E-2"/>
                 </c:manualLayout>
               </c:layout>
               <c:showVal val="1"/>
@@ -189,7 +189,7 @@
               <c:idx val="3"/>
               <c:layout>
                 <c:manualLayout>
-                  <c:x val="-6.3932991697737848E-2"/>
+                  <c:x val="-6.3932991697737876E-2"/>
                   <c:y val="-4.3179654562763445E-2"/>
                 </c:manualLayout>
               </c:layout>
@@ -199,8 +199,8 @@
               <c:idx val="4"/>
               <c:layout>
                 <c:manualLayout>
-                  <c:x val="-1.1022929603058264E-2"/>
-                  <c:y val="-3.9254231420694098E-2"/>
+                  <c:x val="-1.1022929603058269E-2"/>
+                  <c:y val="-3.9254231420694105E-2"/>
                 </c:manualLayout>
               </c:layout>
               <c:showVal val="1"/>
@@ -209,8 +209,8 @@
               <c:idx val="5"/>
               <c:layout>
                 <c:manualLayout>
-                  <c:x val="-6.613757761834948E-3"/>
-                  <c:y val="-3.5328808278624689E-2"/>
+                  <c:x val="-6.6137577618349489E-3"/>
+                  <c:y val="-3.5328808278624696E-2"/>
                 </c:manualLayout>
               </c:layout>
               <c:showVal val="1"/>
@@ -257,10 +257,10 @@
                   <c:v>1.5751491918433933</c:v>
                 </c:pt>
                 <c:pt idx="2">
-                  <c:v>2.0573537454903152</c:v>
+                  <c:v>2.0573537454903157</c:v>
                 </c:pt>
                 <c:pt idx="3">
-                  <c:v>2.434075944294753</c:v>
+                  <c:v>2.4340759442947526</c:v>
                 </c:pt>
                 <c:pt idx="4">
                   <c:v>2.2776259635056739</c:v>
@@ -273,11 +273,11 @@
           </c:yVal>
           <c:smooth val="1"/>
         </c:ser>
-        <c:axId val="49489792"/>
-        <c:axId val="49487872"/>
+        <c:axId val="99501952"/>
+        <c:axId val="99500032"/>
       </c:scatterChart>
       <c:valAx>
-        <c:axId val="49487872"/>
+        <c:axId val="99500032"/>
         <c:scaling>
           <c:orientation val="minMax"/>
         </c:scaling>
@@ -311,7 +311,7 @@
             <c:manualLayout>
               <c:xMode val="edge"/>
               <c:yMode val="edge"/>
-              <c:x val="7.3419654734070599E-3"/>
+              <c:x val="7.3419654734070607E-3"/>
               <c:y val="0.18164292867475237"/>
             </c:manualLayout>
           </c:layout>
@@ -336,12 +336,12 @@
             <a:endParaRPr lang="pl-PL"/>
           </a:p>
         </c:txPr>
-        <c:crossAx val="49489792"/>
+        <c:crossAx val="99501952"/>
         <c:crosses val="autoZero"/>
         <c:crossBetween val="midCat"/>
       </c:valAx>
       <c:valAx>
-        <c:axId val="49489792"/>
+        <c:axId val="99501952"/>
         <c:scaling>
           <c:orientation val="minMax"/>
         </c:scaling>
@@ -390,7 +390,7 @@
             <a:endParaRPr lang="pl-PL"/>
           </a:p>
         </c:txPr>
-        <c:crossAx val="49487872"/>
+        <c:crossAx val="99500032"/>
         <c:crosses val="autoZero"/>
         <c:crossBetween val="midCat"/>
       </c:valAx>

</xml_diff>